<commit_message>
Create new graphic for scaling-alarms-capacity
</commit_message>
<xml_diff>
--- a/images/runtimes/OW-Utilization-Scaling.pptx
+++ b/images/runtimes/OW-Utilization-Scaling.pptx
@@ -4492,7 +4492,7 @@
         </p:blipFill>
         <p:spPr>
           <a:xfrm>
-            <a:off x="232352" y="412235"/>
+            <a:off x="321937" y="381000"/>
             <a:ext cx="425483" cy="508000"/>
           </a:xfrm>
           <a:prstGeom prst="rect">
@@ -5289,7 +5289,7 @@
         </p:blipFill>
         <p:spPr>
           <a:xfrm>
-            <a:off x="289480" y="1844221"/>
+            <a:off x="379065" y="1812986"/>
             <a:ext cx="382935" cy="508000"/>
           </a:xfrm>
           <a:prstGeom prst="rect">
@@ -5967,7 +5967,7 @@
         </p:blipFill>
         <p:spPr>
           <a:xfrm>
-            <a:off x="238212" y="1124023"/>
+            <a:off x="327797" y="1092788"/>
             <a:ext cx="413762" cy="489556"/>
           </a:xfrm>
           <a:prstGeom prst="rect">
@@ -6086,6 +6086,36 @@
               </a:srgbClr>
             </a:innerShdw>
           </a:effectLst>
+        </p:spPr>
+      </p:pic>
+      <p:pic>
+        <p:nvPicPr>
+          <p:cNvPr id="201" name="Picture 200"/>
+          <p:cNvPicPr>
+            <a:picLocks noChangeAspect="1"/>
+          </p:cNvPicPr>
+          <p:nvPr/>
+        </p:nvPicPr>
+        <p:blipFill>
+          <a:blip r:embed="rId15">
+            <a:extLst>
+              <a:ext uri="{28A0092B-C50C-407E-A947-70E740481C1C}">
+                <a14:useLocalDpi xmlns:a14="http://schemas.microsoft.com/office/drawing/2010/main" val="0"/>
+              </a:ext>
+            </a:extLst>
+          </a:blip>
+          <a:stretch>
+            <a:fillRect/>
+          </a:stretch>
+        </p:blipFill>
+        <p:spPr>
+          <a:xfrm>
+            <a:off x="2829588" y="1021076"/>
+            <a:ext cx="412634" cy="429526"/>
+          </a:xfrm>
+          <a:prstGeom prst="rect">
+            <a:avLst/>
+          </a:prstGeom>
         </p:spPr>
       </p:pic>
     </p:spTree>

</xml_diff>